<commit_message>
Task 2 ppt completed
</commit_message>
<xml_diff>
--- a/Airline Data Analysis/Task2.pptx
+++ b/Airline Data Analysis/Task2.pptx
@@ -262,7 +262,7 @@
           <a:p>
             <a:fld id="{6670FE10-F406-47AF-8AE1-E9BA4C7E25F2}" type="datetimeFigureOut">
               <a:rPr lang="en-GB" smtClean="0"/>
-              <a:t>29/08/2024</a:t>
+              <a:t>16/09/2024</a:t>
             </a:fld>
             <a:endParaRPr lang="en-GB" dirty="0"/>
           </a:p>
@@ -596,7 +596,7 @@
           <a:p>
             <a:fld id="{6670FE10-F406-47AF-8AE1-E9BA4C7E25F2}" type="datetimeFigureOut">
               <a:rPr lang="en-GB" smtClean="0"/>
-              <a:t>29/08/2024</a:t>
+              <a:t>16/09/2024</a:t>
             </a:fld>
             <a:endParaRPr lang="en-GB"/>
           </a:p>
@@ -806,7 +806,7 @@
           <a:p>
             <a:fld id="{6670FE10-F406-47AF-8AE1-E9BA4C7E25F2}" type="datetimeFigureOut">
               <a:rPr lang="en-GB" smtClean="0"/>
-              <a:t>29/08/2024</a:t>
+              <a:t>16/09/2024</a:t>
             </a:fld>
             <a:endParaRPr lang="en-GB"/>
           </a:p>
@@ -1006,7 +1006,7 @@
           <a:p>
             <a:fld id="{6670FE10-F406-47AF-8AE1-E9BA4C7E25F2}" type="datetimeFigureOut">
               <a:rPr lang="en-GB" smtClean="0"/>
-              <a:t>29/08/2024</a:t>
+              <a:t>16/09/2024</a:t>
             </a:fld>
             <a:endParaRPr lang="en-GB"/>
           </a:p>
@@ -1413,7 +1413,7 @@
           <a:p>
             <a:fld id="{6670FE10-F406-47AF-8AE1-E9BA4C7E25F2}" type="datetimeFigureOut">
               <a:rPr lang="en-GB" smtClean="0"/>
-              <a:t>29/08/2024</a:t>
+              <a:t>16/09/2024</a:t>
             </a:fld>
             <a:endParaRPr lang="en-GB"/>
           </a:p>
@@ -1681,7 +1681,7 @@
           <a:p>
             <a:fld id="{6670FE10-F406-47AF-8AE1-E9BA4C7E25F2}" type="datetimeFigureOut">
               <a:rPr lang="en-GB" smtClean="0"/>
-              <a:t>29/08/2024</a:t>
+              <a:t>16/09/2024</a:t>
             </a:fld>
             <a:endParaRPr lang="en-GB"/>
           </a:p>
@@ -2096,7 +2096,7 @@
           <a:p>
             <a:fld id="{6670FE10-F406-47AF-8AE1-E9BA4C7E25F2}" type="datetimeFigureOut">
               <a:rPr lang="en-GB" smtClean="0"/>
-              <a:t>29/08/2024</a:t>
+              <a:t>16/09/2024</a:t>
             </a:fld>
             <a:endParaRPr lang="en-GB"/>
           </a:p>
@@ -2238,7 +2238,7 @@
           <a:p>
             <a:fld id="{6670FE10-F406-47AF-8AE1-E9BA4C7E25F2}" type="datetimeFigureOut">
               <a:rPr lang="en-GB" smtClean="0"/>
-              <a:t>29/08/2024</a:t>
+              <a:t>16/09/2024</a:t>
             </a:fld>
             <a:endParaRPr lang="en-GB"/>
           </a:p>
@@ -2351,7 +2351,7 @@
           <a:p>
             <a:fld id="{6670FE10-F406-47AF-8AE1-E9BA4C7E25F2}" type="datetimeFigureOut">
               <a:rPr lang="en-GB" smtClean="0"/>
-              <a:t>29/08/2024</a:t>
+              <a:t>16/09/2024</a:t>
             </a:fld>
             <a:endParaRPr lang="en-GB"/>
           </a:p>
@@ -2664,7 +2664,7 @@
           <a:p>
             <a:fld id="{6670FE10-F406-47AF-8AE1-E9BA4C7E25F2}" type="datetimeFigureOut">
               <a:rPr lang="en-GB" smtClean="0"/>
-              <a:t>29/08/2024</a:t>
+              <a:t>16/09/2024</a:t>
             </a:fld>
             <a:endParaRPr lang="en-GB"/>
           </a:p>
@@ -2953,7 +2953,7 @@
           <a:p>
             <a:fld id="{6670FE10-F406-47AF-8AE1-E9BA4C7E25F2}" type="datetimeFigureOut">
               <a:rPr lang="en-GB" smtClean="0"/>
-              <a:t>29/08/2024</a:t>
+              <a:t>16/09/2024</a:t>
             </a:fld>
             <a:endParaRPr lang="en-GB"/>
           </a:p>
@@ -3196,7 +3196,7 @@
           <a:p>
             <a:fld id="{6670FE10-F406-47AF-8AE1-E9BA4C7E25F2}" type="datetimeFigureOut">
               <a:rPr lang="en-GB" smtClean="0"/>
-              <a:t>29/08/2024</a:t>
+              <a:t>16/09/2024</a:t>
             </a:fld>
             <a:endParaRPr lang="en-GB"/>
           </a:p>
@@ -3643,7 +3643,7 @@
           <a:p>
             <a:r>
               <a:rPr lang="en-GB" dirty="0"/>
-              <a:t>Data Visualisation for Reviews</a:t>
+              <a:t>Prediction on Ticket Booking</a:t>
             </a:r>
           </a:p>
         </p:txBody>
@@ -3735,22 +3735,29 @@
         </p:nvSpPr>
         <p:spPr/>
         <p:txBody>
-          <a:bodyPr/>
+          <a:bodyPr>
+            <a:normAutofit fontScale="90000"/>
+          </a:bodyPr>
           <a:lstStyle/>
           <a:p>
             <a:r>
               <a:rPr lang="en-GB" dirty="0"/>
-              <a:t>Accuracy, Precision, F1 Score and Recall for the models prepared</a:t>
-            </a:r>
+              <a:t>Dependency of the booking decision on other variables and the probability of booking based on </a:t>
+            </a:r>
+            <a:r>
+              <a:rPr lang="en-GB"/>
+              <a:t>different classifiers.</a:t>
+            </a:r>
+            <a:endParaRPr lang="en-GB" dirty="0"/>
           </a:p>
         </p:txBody>
       </p:sp>
       <p:pic>
         <p:nvPicPr>
-          <p:cNvPr id="5" name="Content Placeholder 4">
-            <a:extLst>
-              <a:ext uri="{FF2B5EF4-FFF2-40B4-BE49-F238E27FC236}">
-                <a16:creationId xmlns:a16="http://schemas.microsoft.com/office/drawing/2014/main" id="{F340AEA3-6A6A-136B-046B-37A906A9A2CB}"/>
+          <p:cNvPr id="11" name="Content Placeholder 10">
+            <a:extLst>
+              <a:ext uri="{FF2B5EF4-FFF2-40B4-BE49-F238E27FC236}">
+                <a16:creationId xmlns:a16="http://schemas.microsoft.com/office/drawing/2014/main" id="{20BCCC33-5E4B-6CC3-BABB-01962342A9A8}"/>
               </a:ext>
             </a:extLst>
           </p:cNvPr>
@@ -3769,11 +3776,1272 @@
         </p:blipFill>
         <p:spPr>
           <a:xfrm>
-            <a:off x="2267924" y="1825625"/>
-            <a:ext cx="7656151" cy="4351338"/>
+            <a:off x="-912115" y="2149723"/>
+            <a:ext cx="5607160" cy="3139321"/>
           </a:xfrm>
         </p:spPr>
       </p:pic>
+      <p:graphicFrame>
+        <p:nvGraphicFramePr>
+          <p:cNvPr id="16" name="Table 15">
+            <a:extLst>
+              <a:ext uri="{FF2B5EF4-FFF2-40B4-BE49-F238E27FC236}">
+                <a16:creationId xmlns:a16="http://schemas.microsoft.com/office/drawing/2014/main" id="{35E1038E-80C2-E05C-D65B-64EBFF6FA9BA}"/>
+              </a:ext>
+            </a:extLst>
+          </p:cNvPr>
+          <p:cNvGraphicFramePr>
+            <a:graphicFrameLocks noGrp="1"/>
+          </p:cNvGraphicFramePr>
+          <p:nvPr>
+            <p:extLst>
+              <p:ext uri="{D42A27DB-BD31-4B8C-83A1-F6EECF244321}">
+                <p14:modId xmlns:p14="http://schemas.microsoft.com/office/powerpoint/2010/main" val="1274582964"/>
+              </p:ext>
+            </p:extLst>
+          </p:nvPr>
+        </p:nvGraphicFramePr>
+        <p:xfrm>
+          <a:off x="5308600" y="2236023"/>
+          <a:ext cx="7112000" cy="3167380"/>
+        </p:xfrm>
+        <a:graphic>
+          <a:graphicData uri="http://schemas.openxmlformats.org/drawingml/2006/table">
+            <a:tbl>
+              <a:tblPr firstRow="1" bandRow="1">
+                <a:tableStyleId>{5C22544A-7EE6-4342-B048-85BDC9FD1C3A}</a:tableStyleId>
+              </a:tblPr>
+              <a:tblGrid>
+                <a:gridCol w="1016000">
+                  <a:extLst>
+                    <a:ext uri="{9D8B030D-6E8A-4147-A177-3AD203B41FA5}">
+                      <a16:colId xmlns:a16="http://schemas.microsoft.com/office/drawing/2014/main" val="734259989"/>
+                    </a:ext>
+                  </a:extLst>
+                </a:gridCol>
+                <a:gridCol w="1016000">
+                  <a:extLst>
+                    <a:ext uri="{9D8B030D-6E8A-4147-A177-3AD203B41FA5}">
+                      <a16:colId xmlns:a16="http://schemas.microsoft.com/office/drawing/2014/main" val="2683583533"/>
+                    </a:ext>
+                  </a:extLst>
+                </a:gridCol>
+                <a:gridCol w="1016000">
+                  <a:extLst>
+                    <a:ext uri="{9D8B030D-6E8A-4147-A177-3AD203B41FA5}">
+                      <a16:colId xmlns:a16="http://schemas.microsoft.com/office/drawing/2014/main" val="920726406"/>
+                    </a:ext>
+                  </a:extLst>
+                </a:gridCol>
+                <a:gridCol w="1016000">
+                  <a:extLst>
+                    <a:ext uri="{9D8B030D-6E8A-4147-A177-3AD203B41FA5}">
+                      <a16:colId xmlns:a16="http://schemas.microsoft.com/office/drawing/2014/main" val="717579960"/>
+                    </a:ext>
+                  </a:extLst>
+                </a:gridCol>
+                <a:gridCol w="1016000">
+                  <a:extLst>
+                    <a:ext uri="{9D8B030D-6E8A-4147-A177-3AD203B41FA5}">
+                      <a16:colId xmlns:a16="http://schemas.microsoft.com/office/drawing/2014/main" val="290918700"/>
+                    </a:ext>
+                  </a:extLst>
+                </a:gridCol>
+                <a:gridCol w="1016000">
+                  <a:extLst>
+                    <a:ext uri="{9D8B030D-6E8A-4147-A177-3AD203B41FA5}">
+                      <a16:colId xmlns:a16="http://schemas.microsoft.com/office/drawing/2014/main" val="2759062780"/>
+                    </a:ext>
+                  </a:extLst>
+                </a:gridCol>
+                <a:gridCol w="1016000">
+                  <a:extLst>
+                    <a:ext uri="{9D8B030D-6E8A-4147-A177-3AD203B41FA5}">
+                      <a16:colId xmlns:a16="http://schemas.microsoft.com/office/drawing/2014/main" val="488451556"/>
+                    </a:ext>
+                  </a:extLst>
+                </a:gridCol>
+              </a:tblGrid>
+              <a:tr h="370840">
+                <a:tc>
+                  <a:txBody>
+                    <a:bodyPr/>
+                    <a:lstStyle/>
+                    <a:p>
+                      <a:pPr algn="ctr" fontAlgn="ctr"/>
+                      <a:r>
+                        <a:rPr lang="en-IN" sz="1200" b="1" i="0" u="none" strike="noStrike">
+                          <a:solidFill>
+                            <a:srgbClr val="000000"/>
+                          </a:solidFill>
+                          <a:effectLst/>
+                          <a:latin typeface="Times New Roman" panose="02020603050405020304" pitchFamily="18" charset="0"/>
+                        </a:rPr>
+                        <a:t>Classifier</a:t>
+                      </a:r>
+                    </a:p>
+                  </a:txBody>
+                  <a:tcPr marL="9525" marR="9525" marT="9525" marB="0" anchor="ctr"/>
+                </a:tc>
+                <a:tc>
+                  <a:txBody>
+                    <a:bodyPr/>
+                    <a:lstStyle/>
+                    <a:p>
+                      <a:pPr algn="ctr" fontAlgn="ctr"/>
+                      <a:r>
+                        <a:rPr lang="en-IN" sz="1200" b="1" i="0" u="none" strike="noStrike">
+                          <a:solidFill>
+                            <a:srgbClr val="000000"/>
+                          </a:solidFill>
+                          <a:effectLst/>
+                          <a:latin typeface="Times New Roman" panose="02020603050405020304" pitchFamily="18" charset="0"/>
+                        </a:rPr>
+                        <a:t>Accuracy</a:t>
+                      </a:r>
+                    </a:p>
+                  </a:txBody>
+                  <a:tcPr marL="9525" marR="9525" marT="9525" marB="0" anchor="ctr"/>
+                </a:tc>
+                <a:tc>
+                  <a:txBody>
+                    <a:bodyPr/>
+                    <a:lstStyle/>
+                    <a:p>
+                      <a:pPr algn="ctr" fontAlgn="ctr"/>
+                      <a:r>
+                        <a:rPr lang="en-IN" sz="1200" b="1" i="0" u="none" strike="noStrike">
+                          <a:solidFill>
+                            <a:srgbClr val="000000"/>
+                          </a:solidFill>
+                          <a:effectLst/>
+                          <a:latin typeface="Times New Roman" panose="02020603050405020304" pitchFamily="18" charset="0"/>
+                        </a:rPr>
+                        <a:t>Precision</a:t>
+                      </a:r>
+                    </a:p>
+                  </a:txBody>
+                  <a:tcPr marL="9525" marR="9525" marT="9525" marB="0" anchor="ctr"/>
+                </a:tc>
+                <a:tc>
+                  <a:txBody>
+                    <a:bodyPr/>
+                    <a:lstStyle/>
+                    <a:p>
+                      <a:pPr algn="ctr" fontAlgn="ctr"/>
+                      <a:r>
+                        <a:rPr lang="en-IN" sz="1200" b="1" i="0" u="none" strike="noStrike">
+                          <a:solidFill>
+                            <a:srgbClr val="000000"/>
+                          </a:solidFill>
+                          <a:effectLst/>
+                          <a:latin typeface="Times New Roman" panose="02020603050405020304" pitchFamily="18" charset="0"/>
+                        </a:rPr>
+                        <a:t>Recall</a:t>
+                      </a:r>
+                    </a:p>
+                  </a:txBody>
+                  <a:tcPr marL="9525" marR="9525" marT="9525" marB="0" anchor="ctr"/>
+                </a:tc>
+                <a:tc>
+                  <a:txBody>
+                    <a:bodyPr/>
+                    <a:lstStyle/>
+                    <a:p>
+                      <a:pPr algn="ctr" fontAlgn="ctr"/>
+                      <a:r>
+                        <a:rPr lang="en-IN" sz="1200" b="1" i="0" u="none" strike="noStrike">
+                          <a:solidFill>
+                            <a:srgbClr val="000000"/>
+                          </a:solidFill>
+                          <a:effectLst/>
+                          <a:latin typeface="Times New Roman" panose="02020603050405020304" pitchFamily="18" charset="0"/>
+                        </a:rPr>
+                        <a:t>F1 Score</a:t>
+                      </a:r>
+                    </a:p>
+                  </a:txBody>
+                  <a:tcPr marL="9525" marR="9525" marT="9525" marB="0" anchor="ctr"/>
+                </a:tc>
+                <a:tc>
+                  <a:txBody>
+                    <a:bodyPr/>
+                    <a:lstStyle/>
+                    <a:p>
+                      <a:pPr algn="ctr" fontAlgn="ctr"/>
+                      <a:r>
+                        <a:rPr lang="en-IN" sz="1200" b="1" i="0" u="none" strike="noStrike">
+                          <a:solidFill>
+                            <a:srgbClr val="000000"/>
+                          </a:solidFill>
+                          <a:effectLst/>
+                          <a:latin typeface="Times New Roman" panose="02020603050405020304" pitchFamily="18" charset="0"/>
+                        </a:rPr>
+                        <a:t>Book Percentage (%)</a:t>
+                      </a:r>
+                    </a:p>
+                  </a:txBody>
+                  <a:tcPr marL="9525" marR="9525" marT="9525" marB="0" anchor="ctr"/>
+                </a:tc>
+                <a:tc>
+                  <a:txBody>
+                    <a:bodyPr/>
+                    <a:lstStyle/>
+                    <a:p>
+                      <a:pPr algn="ctr" fontAlgn="ctr"/>
+                      <a:r>
+                        <a:rPr lang="en-IN" sz="1200" b="1" i="0" u="none" strike="noStrike">
+                          <a:solidFill>
+                            <a:srgbClr val="000000"/>
+                          </a:solidFill>
+                          <a:effectLst/>
+                          <a:latin typeface="Times New Roman" panose="02020603050405020304" pitchFamily="18" charset="0"/>
+                        </a:rPr>
+                        <a:t>Not Book Percentage (%)</a:t>
+                      </a:r>
+                    </a:p>
+                  </a:txBody>
+                  <a:tcPr marL="9525" marR="9525" marT="9525" marB="0" anchor="ctr"/>
+                </a:tc>
+                <a:extLst>
+                  <a:ext uri="{0D108BD9-81ED-4DB2-BD59-A6C34878D82A}">
+                    <a16:rowId xmlns:a16="http://schemas.microsoft.com/office/drawing/2014/main" val="2064822098"/>
+                  </a:ext>
+                </a:extLst>
+              </a:tr>
+              <a:tr h="370840">
+                <a:tc>
+                  <a:txBody>
+                    <a:bodyPr/>
+                    <a:lstStyle/>
+                    <a:p>
+                      <a:pPr algn="ctr" fontAlgn="ctr"/>
+                      <a:r>
+                        <a:rPr lang="en-IN" sz="1200" b="1" i="0" u="none" strike="noStrike">
+                          <a:solidFill>
+                            <a:srgbClr val="000000"/>
+                          </a:solidFill>
+                          <a:effectLst/>
+                          <a:latin typeface="Times New Roman" panose="02020603050405020304" pitchFamily="18" charset="0"/>
+                        </a:rPr>
+                        <a:t>Decision Tree</a:t>
+                      </a:r>
+                    </a:p>
+                  </a:txBody>
+                  <a:tcPr marL="9525" marR="9525" marT="9525" marB="0" anchor="ctr"/>
+                </a:tc>
+                <a:tc>
+                  <a:txBody>
+                    <a:bodyPr/>
+                    <a:lstStyle/>
+                    <a:p>
+                      <a:pPr algn="ctr" fontAlgn="ctr"/>
+                      <a:r>
+                        <a:rPr lang="en-IN" sz="1200" b="1" i="0" u="none" strike="noStrike">
+                          <a:solidFill>
+                            <a:srgbClr val="000000"/>
+                          </a:solidFill>
+                          <a:effectLst/>
+                          <a:latin typeface="Times New Roman" panose="02020603050405020304" pitchFamily="18" charset="0"/>
+                        </a:rPr>
+                        <a:t>0.7787</a:t>
+                      </a:r>
+                    </a:p>
+                  </a:txBody>
+                  <a:tcPr marL="9525" marR="9525" marT="9525" marB="0" anchor="ctr"/>
+                </a:tc>
+                <a:tc>
+                  <a:txBody>
+                    <a:bodyPr/>
+                    <a:lstStyle/>
+                    <a:p>
+                      <a:pPr algn="ctr" fontAlgn="ctr"/>
+                      <a:r>
+                        <a:rPr lang="en-IN" sz="1200" b="1" i="0" u="none" strike="noStrike">
+                          <a:solidFill>
+                            <a:srgbClr val="000000"/>
+                          </a:solidFill>
+                          <a:effectLst/>
+                          <a:latin typeface="Times New Roman" panose="02020603050405020304" pitchFamily="18" charset="0"/>
+                        </a:rPr>
+                        <a:t>0.28171531</a:t>
+                      </a:r>
+                    </a:p>
+                  </a:txBody>
+                  <a:tcPr marL="9525" marR="9525" marT="9525" marB="0" anchor="ctr"/>
+                </a:tc>
+                <a:tc>
+                  <a:txBody>
+                    <a:bodyPr/>
+                    <a:lstStyle/>
+                    <a:p>
+                      <a:pPr algn="ctr" fontAlgn="ctr"/>
+                      <a:r>
+                        <a:rPr lang="en-IN" sz="1200" b="1" i="0" u="none" strike="noStrike">
+                          <a:solidFill>
+                            <a:srgbClr val="000000"/>
+                          </a:solidFill>
+                          <a:effectLst/>
+                          <a:latin typeface="Times New Roman" panose="02020603050405020304" pitchFamily="18" charset="0"/>
+                        </a:rPr>
+                        <a:t>0.31959459</a:t>
+                      </a:r>
+                    </a:p>
+                  </a:txBody>
+                  <a:tcPr marL="9525" marR="9525" marT="9525" marB="0" anchor="ctr"/>
+                </a:tc>
+                <a:tc>
+                  <a:txBody>
+                    <a:bodyPr/>
+                    <a:lstStyle/>
+                    <a:p>
+                      <a:pPr algn="ctr" fontAlgn="ctr"/>
+                      <a:r>
+                        <a:rPr lang="en-IN" sz="1200" b="1" i="0" u="none" strike="noStrike">
+                          <a:solidFill>
+                            <a:srgbClr val="000000"/>
+                          </a:solidFill>
+                          <a:effectLst/>
+                          <a:latin typeface="Times New Roman" panose="02020603050405020304" pitchFamily="18" charset="0"/>
+                        </a:rPr>
+                        <a:t>0.29946186</a:t>
+                      </a:r>
+                    </a:p>
+                  </a:txBody>
+                  <a:tcPr marL="9525" marR="9525" marT="9525" marB="0" anchor="ctr"/>
+                </a:tc>
+                <a:tc>
+                  <a:txBody>
+                    <a:bodyPr/>
+                    <a:lstStyle/>
+                    <a:p>
+                      <a:pPr algn="ctr" fontAlgn="ctr"/>
+                      <a:r>
+                        <a:rPr lang="en-IN" sz="1200" b="1" i="0" u="none" strike="noStrike">
+                          <a:solidFill>
+                            <a:srgbClr val="000000"/>
+                          </a:solidFill>
+                          <a:effectLst/>
+                          <a:latin typeface="Times New Roman" panose="02020603050405020304" pitchFamily="18" charset="0"/>
+                        </a:rPr>
+                        <a:t>16.79</a:t>
+                      </a:r>
+                    </a:p>
+                  </a:txBody>
+                  <a:tcPr marL="9525" marR="9525" marT="9525" marB="0" anchor="ctr"/>
+                </a:tc>
+                <a:tc>
+                  <a:txBody>
+                    <a:bodyPr/>
+                    <a:lstStyle/>
+                    <a:p>
+                      <a:pPr algn="ctr" fontAlgn="ctr"/>
+                      <a:r>
+                        <a:rPr lang="en-IN" sz="1200" b="1" i="0" u="none" strike="noStrike">
+                          <a:solidFill>
+                            <a:srgbClr val="000000"/>
+                          </a:solidFill>
+                          <a:effectLst/>
+                          <a:latin typeface="Times New Roman" panose="02020603050405020304" pitchFamily="18" charset="0"/>
+                        </a:rPr>
+                        <a:t>83.21</a:t>
+                      </a:r>
+                    </a:p>
+                  </a:txBody>
+                  <a:tcPr marL="9525" marR="9525" marT="9525" marB="0" anchor="ctr"/>
+                </a:tc>
+                <a:extLst>
+                  <a:ext uri="{0D108BD9-81ED-4DB2-BD59-A6C34878D82A}">
+                    <a16:rowId xmlns:a16="http://schemas.microsoft.com/office/drawing/2014/main" val="1638012382"/>
+                  </a:ext>
+                </a:extLst>
+              </a:tr>
+              <a:tr h="370840">
+                <a:tc>
+                  <a:txBody>
+                    <a:bodyPr/>
+                    <a:lstStyle/>
+                    <a:p>
+                      <a:pPr algn="ctr" fontAlgn="ctr"/>
+                      <a:r>
+                        <a:rPr lang="en-IN" sz="1200" b="1" i="0" u="none" strike="noStrike">
+                          <a:solidFill>
+                            <a:srgbClr val="000000"/>
+                          </a:solidFill>
+                          <a:effectLst/>
+                          <a:latin typeface="Times New Roman" panose="02020603050405020304" pitchFamily="18" charset="0"/>
+                        </a:rPr>
+                        <a:t>Random Forest</a:t>
+                      </a:r>
+                    </a:p>
+                  </a:txBody>
+                  <a:tcPr marL="9525" marR="9525" marT="9525" marB="0" anchor="ctr"/>
+                </a:tc>
+                <a:tc>
+                  <a:txBody>
+                    <a:bodyPr/>
+                    <a:lstStyle/>
+                    <a:p>
+                      <a:pPr algn="ctr" fontAlgn="ctr"/>
+                      <a:r>
+                        <a:rPr lang="en-IN" sz="1200" b="1" i="0" u="none" strike="noStrike">
+                          <a:solidFill>
+                            <a:srgbClr val="000000"/>
+                          </a:solidFill>
+                          <a:effectLst/>
+                          <a:latin typeface="Times New Roman" panose="02020603050405020304" pitchFamily="18" charset="0"/>
+                        </a:rPr>
+                        <a:t>0.8543</a:t>
+                      </a:r>
+                    </a:p>
+                  </a:txBody>
+                  <a:tcPr marL="9525" marR="9525" marT="9525" marB="0" anchor="ctr"/>
+                </a:tc>
+                <a:tc>
+                  <a:txBody>
+                    <a:bodyPr/>
+                    <a:lstStyle/>
+                    <a:p>
+                      <a:pPr algn="ctr" fontAlgn="ctr"/>
+                      <a:r>
+                        <a:rPr lang="en-IN" sz="1200" b="1" i="0" u="none" strike="noStrike">
+                          <a:solidFill>
+                            <a:srgbClr val="000000"/>
+                          </a:solidFill>
+                          <a:effectLst/>
+                          <a:latin typeface="Times New Roman" panose="02020603050405020304" pitchFamily="18" charset="0"/>
+                        </a:rPr>
+                        <a:t>0.53898305</a:t>
+                      </a:r>
+                    </a:p>
+                  </a:txBody>
+                  <a:tcPr marL="9525" marR="9525" marT="9525" marB="0" anchor="ctr"/>
+                </a:tc>
+                <a:tc>
+                  <a:txBody>
+                    <a:bodyPr/>
+                    <a:lstStyle/>
+                    <a:p>
+                      <a:pPr algn="ctr" fontAlgn="ctr"/>
+                      <a:r>
+                        <a:rPr lang="en-IN" sz="1200" b="1" i="0" u="none" strike="noStrike" dirty="0">
+                          <a:solidFill>
+                            <a:srgbClr val="000000"/>
+                          </a:solidFill>
+                          <a:effectLst/>
+                          <a:latin typeface="Times New Roman" panose="02020603050405020304" pitchFamily="18" charset="0"/>
+                        </a:rPr>
+                        <a:t>0.10743243</a:t>
+                      </a:r>
+                    </a:p>
+                  </a:txBody>
+                  <a:tcPr marL="9525" marR="9525" marT="9525" marB="0" anchor="ctr"/>
+                </a:tc>
+                <a:tc>
+                  <a:txBody>
+                    <a:bodyPr/>
+                    <a:lstStyle/>
+                    <a:p>
+                      <a:pPr algn="ctr" fontAlgn="ctr"/>
+                      <a:r>
+                        <a:rPr lang="en-IN" sz="1200" b="1" i="0" u="none" strike="noStrike">
+                          <a:solidFill>
+                            <a:srgbClr val="000000"/>
+                          </a:solidFill>
+                          <a:effectLst/>
+                          <a:latin typeface="Times New Roman" panose="02020603050405020304" pitchFamily="18" charset="0"/>
+                        </a:rPr>
+                        <a:t>0.17915493</a:t>
+                      </a:r>
+                    </a:p>
+                  </a:txBody>
+                  <a:tcPr marL="9525" marR="9525" marT="9525" marB="0" anchor="ctr"/>
+                </a:tc>
+                <a:tc>
+                  <a:txBody>
+                    <a:bodyPr/>
+                    <a:lstStyle/>
+                    <a:p>
+                      <a:pPr algn="ctr" fontAlgn="ctr"/>
+                      <a:r>
+                        <a:rPr lang="en-IN" sz="1200" b="1" i="0" u="none" strike="noStrike">
+                          <a:solidFill>
+                            <a:srgbClr val="000000"/>
+                          </a:solidFill>
+                          <a:effectLst/>
+                          <a:latin typeface="Times New Roman" panose="02020603050405020304" pitchFamily="18" charset="0"/>
+                        </a:rPr>
+                        <a:t>2.95</a:t>
+                      </a:r>
+                    </a:p>
+                  </a:txBody>
+                  <a:tcPr marL="9525" marR="9525" marT="9525" marB="0" anchor="ctr"/>
+                </a:tc>
+                <a:tc>
+                  <a:txBody>
+                    <a:bodyPr/>
+                    <a:lstStyle/>
+                    <a:p>
+                      <a:pPr algn="ctr" fontAlgn="ctr"/>
+                      <a:r>
+                        <a:rPr lang="en-IN" sz="1200" b="1" i="0" u="none" strike="noStrike">
+                          <a:solidFill>
+                            <a:srgbClr val="000000"/>
+                          </a:solidFill>
+                          <a:effectLst/>
+                          <a:latin typeface="Times New Roman" panose="02020603050405020304" pitchFamily="18" charset="0"/>
+                        </a:rPr>
+                        <a:t>97.05</a:t>
+                      </a:r>
+                    </a:p>
+                  </a:txBody>
+                  <a:tcPr marL="9525" marR="9525" marT="9525" marB="0" anchor="ctr"/>
+                </a:tc>
+                <a:extLst>
+                  <a:ext uri="{0D108BD9-81ED-4DB2-BD59-A6C34878D82A}">
+                    <a16:rowId xmlns:a16="http://schemas.microsoft.com/office/drawing/2014/main" val="3483656174"/>
+                  </a:ext>
+                </a:extLst>
+              </a:tr>
+              <a:tr h="370840">
+                <a:tc>
+                  <a:txBody>
+                    <a:bodyPr/>
+                    <a:lstStyle/>
+                    <a:p>
+                      <a:pPr algn="ctr" fontAlgn="ctr"/>
+                      <a:r>
+                        <a:rPr lang="en-IN" sz="1200" b="1" i="0" u="none" strike="noStrike">
+                          <a:solidFill>
+                            <a:srgbClr val="000000"/>
+                          </a:solidFill>
+                          <a:effectLst/>
+                          <a:latin typeface="Times New Roman" panose="02020603050405020304" pitchFamily="18" charset="0"/>
+                        </a:rPr>
+                        <a:t>SVM</a:t>
+                      </a:r>
+                    </a:p>
+                  </a:txBody>
+                  <a:tcPr marL="9525" marR="9525" marT="9525" marB="0" anchor="ctr"/>
+                </a:tc>
+                <a:tc>
+                  <a:txBody>
+                    <a:bodyPr/>
+                    <a:lstStyle/>
+                    <a:p>
+                      <a:pPr algn="ctr" fontAlgn="ctr"/>
+                      <a:r>
+                        <a:rPr lang="en-IN" sz="1200" b="1" i="0" u="none" strike="noStrike">
+                          <a:solidFill>
+                            <a:srgbClr val="000000"/>
+                          </a:solidFill>
+                          <a:effectLst/>
+                          <a:latin typeface="Times New Roman" panose="02020603050405020304" pitchFamily="18" charset="0"/>
+                        </a:rPr>
+                        <a:t>0.852</a:t>
+                      </a:r>
+                    </a:p>
+                  </a:txBody>
+                  <a:tcPr marL="9525" marR="9525" marT="9525" marB="0" anchor="ctr"/>
+                </a:tc>
+                <a:tc>
+                  <a:txBody>
+                    <a:bodyPr/>
+                    <a:lstStyle/>
+                    <a:p>
+                      <a:pPr algn="ctr" fontAlgn="ctr"/>
+                      <a:r>
+                        <a:rPr lang="en-IN" sz="1200" b="1" i="0" u="none" strike="noStrike">
+                          <a:solidFill>
+                            <a:srgbClr val="000000"/>
+                          </a:solidFill>
+                          <a:effectLst/>
+                          <a:latin typeface="Times New Roman" panose="02020603050405020304" pitchFamily="18" charset="0"/>
+                        </a:rPr>
+                        <a:t>1</a:t>
+                      </a:r>
+                    </a:p>
+                  </a:txBody>
+                  <a:tcPr marL="9525" marR="9525" marT="9525" marB="0" anchor="ctr"/>
+                </a:tc>
+                <a:tc>
+                  <a:txBody>
+                    <a:bodyPr/>
+                    <a:lstStyle/>
+                    <a:p>
+                      <a:pPr algn="ctr" fontAlgn="ctr"/>
+                      <a:r>
+                        <a:rPr lang="en-IN" sz="1200" b="1" i="0" u="none" strike="noStrike">
+                          <a:solidFill>
+                            <a:srgbClr val="000000"/>
+                          </a:solidFill>
+                          <a:effectLst/>
+                          <a:latin typeface="Times New Roman" panose="02020603050405020304" pitchFamily="18" charset="0"/>
+                        </a:rPr>
+                        <a:t>0</a:t>
+                      </a:r>
+                    </a:p>
+                  </a:txBody>
+                  <a:tcPr marL="9525" marR="9525" marT="9525" marB="0" anchor="ctr"/>
+                </a:tc>
+                <a:tc>
+                  <a:txBody>
+                    <a:bodyPr/>
+                    <a:lstStyle/>
+                    <a:p>
+                      <a:pPr algn="ctr" fontAlgn="ctr"/>
+                      <a:r>
+                        <a:rPr lang="en-IN" sz="1200" b="1" i="0" u="none" strike="noStrike">
+                          <a:solidFill>
+                            <a:srgbClr val="000000"/>
+                          </a:solidFill>
+                          <a:effectLst/>
+                          <a:latin typeface="Times New Roman" panose="02020603050405020304" pitchFamily="18" charset="0"/>
+                        </a:rPr>
+                        <a:t>0</a:t>
+                      </a:r>
+                    </a:p>
+                  </a:txBody>
+                  <a:tcPr marL="9525" marR="9525" marT="9525" marB="0" anchor="ctr"/>
+                </a:tc>
+                <a:tc>
+                  <a:txBody>
+                    <a:bodyPr/>
+                    <a:lstStyle/>
+                    <a:p>
+                      <a:pPr algn="ctr" fontAlgn="ctr"/>
+                      <a:r>
+                        <a:rPr lang="en-IN" sz="1200" b="1" i="0" u="none" strike="noStrike">
+                          <a:solidFill>
+                            <a:srgbClr val="000000"/>
+                          </a:solidFill>
+                          <a:effectLst/>
+                          <a:latin typeface="Times New Roman" panose="02020603050405020304" pitchFamily="18" charset="0"/>
+                        </a:rPr>
+                        <a:t>0</a:t>
+                      </a:r>
+                    </a:p>
+                  </a:txBody>
+                  <a:tcPr marL="9525" marR="9525" marT="9525" marB="0" anchor="ctr"/>
+                </a:tc>
+                <a:tc>
+                  <a:txBody>
+                    <a:bodyPr/>
+                    <a:lstStyle/>
+                    <a:p>
+                      <a:pPr algn="ctr" fontAlgn="ctr"/>
+                      <a:r>
+                        <a:rPr lang="en-IN" sz="1200" b="1" i="0" u="none" strike="noStrike">
+                          <a:solidFill>
+                            <a:srgbClr val="000000"/>
+                          </a:solidFill>
+                          <a:effectLst/>
+                          <a:latin typeface="Times New Roman" panose="02020603050405020304" pitchFamily="18" charset="0"/>
+                        </a:rPr>
+                        <a:t>100</a:t>
+                      </a:r>
+                    </a:p>
+                  </a:txBody>
+                  <a:tcPr marL="9525" marR="9525" marT="9525" marB="0" anchor="ctr"/>
+                </a:tc>
+                <a:extLst>
+                  <a:ext uri="{0D108BD9-81ED-4DB2-BD59-A6C34878D82A}">
+                    <a16:rowId xmlns:a16="http://schemas.microsoft.com/office/drawing/2014/main" val="3172811117"/>
+                  </a:ext>
+                </a:extLst>
+              </a:tr>
+              <a:tr h="370840">
+                <a:tc>
+                  <a:txBody>
+                    <a:bodyPr/>
+                    <a:lstStyle/>
+                    <a:p>
+                      <a:pPr algn="ctr" fontAlgn="ctr"/>
+                      <a:r>
+                        <a:rPr lang="en-IN" sz="1200" b="1" i="0" u="none" strike="noStrike">
+                          <a:solidFill>
+                            <a:srgbClr val="000000"/>
+                          </a:solidFill>
+                          <a:effectLst/>
+                          <a:latin typeface="Times New Roman" panose="02020603050405020304" pitchFamily="18" charset="0"/>
+                        </a:rPr>
+                        <a:t>K-Nearest Neighbors</a:t>
+                      </a:r>
+                    </a:p>
+                  </a:txBody>
+                  <a:tcPr marL="9525" marR="9525" marT="9525" marB="0" anchor="ctr"/>
+                </a:tc>
+                <a:tc>
+                  <a:txBody>
+                    <a:bodyPr/>
+                    <a:lstStyle/>
+                    <a:p>
+                      <a:pPr algn="ctr" fontAlgn="ctr"/>
+                      <a:r>
+                        <a:rPr lang="en-IN" sz="1200" b="1" i="0" u="none" strike="noStrike">
+                          <a:solidFill>
+                            <a:srgbClr val="000000"/>
+                          </a:solidFill>
+                          <a:effectLst/>
+                          <a:latin typeface="Times New Roman" panose="02020603050405020304" pitchFamily="18" charset="0"/>
+                        </a:rPr>
+                        <a:t>0.8312</a:t>
+                      </a:r>
+                    </a:p>
+                  </a:txBody>
+                  <a:tcPr marL="9525" marR="9525" marT="9525" marB="0" anchor="ctr"/>
+                </a:tc>
+                <a:tc>
+                  <a:txBody>
+                    <a:bodyPr/>
+                    <a:lstStyle/>
+                    <a:p>
+                      <a:pPr algn="ctr" fontAlgn="ctr"/>
+                      <a:r>
+                        <a:rPr lang="en-IN" sz="1200" b="1" i="0" u="none" strike="noStrike">
+                          <a:solidFill>
+                            <a:srgbClr val="000000"/>
+                          </a:solidFill>
+                          <a:effectLst/>
+                          <a:latin typeface="Times New Roman" panose="02020603050405020304" pitchFamily="18" charset="0"/>
+                        </a:rPr>
+                        <a:t>0.3429003</a:t>
+                      </a:r>
+                    </a:p>
+                  </a:txBody>
+                  <a:tcPr marL="9525" marR="9525" marT="9525" marB="0" anchor="ctr"/>
+                </a:tc>
+                <a:tc>
+                  <a:txBody>
+                    <a:bodyPr/>
+                    <a:lstStyle/>
+                    <a:p>
+                      <a:pPr algn="ctr" fontAlgn="ctr"/>
+                      <a:r>
+                        <a:rPr lang="en-IN" sz="1200" b="1" i="0" u="none" strike="noStrike">
+                          <a:solidFill>
+                            <a:srgbClr val="000000"/>
+                          </a:solidFill>
+                          <a:effectLst/>
+                          <a:latin typeface="Times New Roman" panose="02020603050405020304" pitchFamily="18" charset="0"/>
+                        </a:rPr>
+                        <a:t>0.15337838</a:t>
+                      </a:r>
+                    </a:p>
+                  </a:txBody>
+                  <a:tcPr marL="9525" marR="9525" marT="9525" marB="0" anchor="ctr"/>
+                </a:tc>
+                <a:tc>
+                  <a:txBody>
+                    <a:bodyPr/>
+                    <a:lstStyle/>
+                    <a:p>
+                      <a:pPr algn="ctr" fontAlgn="ctr"/>
+                      <a:r>
+                        <a:rPr lang="en-IN" sz="1200" b="1" i="0" u="none" strike="noStrike">
+                          <a:solidFill>
+                            <a:srgbClr val="000000"/>
+                          </a:solidFill>
+                          <a:effectLst/>
+                          <a:latin typeface="Times New Roman" panose="02020603050405020304" pitchFamily="18" charset="0"/>
+                        </a:rPr>
+                        <a:t>0.21195145</a:t>
+                      </a:r>
+                    </a:p>
+                  </a:txBody>
+                  <a:tcPr marL="9525" marR="9525" marT="9525" marB="0" anchor="ctr"/>
+                </a:tc>
+                <a:tc>
+                  <a:txBody>
+                    <a:bodyPr/>
+                    <a:lstStyle/>
+                    <a:p>
+                      <a:pPr algn="ctr" fontAlgn="ctr"/>
+                      <a:r>
+                        <a:rPr lang="en-IN" sz="1200" b="1" i="0" u="none" strike="noStrike">
+                          <a:solidFill>
+                            <a:srgbClr val="000000"/>
+                          </a:solidFill>
+                          <a:effectLst/>
+                          <a:latin typeface="Times New Roman" panose="02020603050405020304" pitchFamily="18" charset="0"/>
+                        </a:rPr>
+                        <a:t>6.62</a:t>
+                      </a:r>
+                    </a:p>
+                  </a:txBody>
+                  <a:tcPr marL="9525" marR="9525" marT="9525" marB="0" anchor="ctr"/>
+                </a:tc>
+                <a:tc>
+                  <a:txBody>
+                    <a:bodyPr/>
+                    <a:lstStyle/>
+                    <a:p>
+                      <a:pPr algn="ctr" fontAlgn="ctr"/>
+                      <a:r>
+                        <a:rPr lang="en-IN" sz="1200" b="1" i="0" u="none" strike="noStrike">
+                          <a:solidFill>
+                            <a:srgbClr val="000000"/>
+                          </a:solidFill>
+                          <a:effectLst/>
+                          <a:latin typeface="Times New Roman" panose="02020603050405020304" pitchFamily="18" charset="0"/>
+                        </a:rPr>
+                        <a:t>93.38</a:t>
+                      </a:r>
+                    </a:p>
+                  </a:txBody>
+                  <a:tcPr marL="9525" marR="9525" marT="9525" marB="0" anchor="ctr"/>
+                </a:tc>
+                <a:extLst>
+                  <a:ext uri="{0D108BD9-81ED-4DB2-BD59-A6C34878D82A}">
+                    <a16:rowId xmlns:a16="http://schemas.microsoft.com/office/drawing/2014/main" val="4196732587"/>
+                  </a:ext>
+                </a:extLst>
+              </a:tr>
+              <a:tr h="370840">
+                <a:tc>
+                  <a:txBody>
+                    <a:bodyPr/>
+                    <a:lstStyle/>
+                    <a:p>
+                      <a:pPr algn="ctr" fontAlgn="ctr"/>
+                      <a:r>
+                        <a:rPr lang="en-IN" sz="1200" b="1" i="0" u="none" strike="noStrike">
+                          <a:solidFill>
+                            <a:srgbClr val="000000"/>
+                          </a:solidFill>
+                          <a:effectLst/>
+                          <a:latin typeface="Times New Roman" panose="02020603050405020304" pitchFamily="18" charset="0"/>
+                        </a:rPr>
+                        <a:t>Naive Bayes</a:t>
+                      </a:r>
+                    </a:p>
+                  </a:txBody>
+                  <a:tcPr marL="9525" marR="9525" marT="9525" marB="0" anchor="ctr"/>
+                </a:tc>
+                <a:tc>
+                  <a:txBody>
+                    <a:bodyPr/>
+                    <a:lstStyle/>
+                    <a:p>
+                      <a:pPr algn="ctr" fontAlgn="ctr"/>
+                      <a:r>
+                        <a:rPr lang="en-IN" sz="1200" b="1" i="0" u="none" strike="noStrike">
+                          <a:solidFill>
+                            <a:srgbClr val="000000"/>
+                          </a:solidFill>
+                          <a:effectLst/>
+                          <a:latin typeface="Times New Roman" panose="02020603050405020304" pitchFamily="18" charset="0"/>
+                        </a:rPr>
+                        <a:t>0.8245</a:t>
+                      </a:r>
+                    </a:p>
+                  </a:txBody>
+                  <a:tcPr marL="9525" marR="9525" marT="9525" marB="0" anchor="ctr"/>
+                </a:tc>
+                <a:tc>
+                  <a:txBody>
+                    <a:bodyPr/>
+                    <a:lstStyle/>
+                    <a:p>
+                      <a:pPr algn="ctr" fontAlgn="ctr"/>
+                      <a:r>
+                        <a:rPr lang="en-IN" sz="1200" b="1" i="0" u="none" strike="noStrike">
+                          <a:solidFill>
+                            <a:srgbClr val="000000"/>
+                          </a:solidFill>
+                          <a:effectLst/>
+                          <a:latin typeface="Times New Roman" panose="02020603050405020304" pitchFamily="18" charset="0"/>
+                        </a:rPr>
+                        <a:t>0.29809104</a:t>
+                      </a:r>
+                    </a:p>
+                  </a:txBody>
+                  <a:tcPr marL="9525" marR="9525" marT="9525" marB="0" anchor="ctr"/>
+                </a:tc>
+                <a:tc>
+                  <a:txBody>
+                    <a:bodyPr/>
+                    <a:lstStyle/>
+                    <a:p>
+                      <a:pPr algn="ctr" fontAlgn="ctr"/>
+                      <a:r>
+                        <a:rPr lang="en-IN" sz="1200" b="1" i="0" u="none" strike="noStrike">
+                          <a:solidFill>
+                            <a:srgbClr val="000000"/>
+                          </a:solidFill>
+                          <a:effectLst/>
+                          <a:latin typeface="Times New Roman" panose="02020603050405020304" pitchFamily="18" charset="0"/>
+                        </a:rPr>
+                        <a:t>0.13716216</a:t>
+                      </a:r>
+                    </a:p>
+                  </a:txBody>
+                  <a:tcPr marL="9525" marR="9525" marT="9525" marB="0" anchor="ctr"/>
+                </a:tc>
+                <a:tc>
+                  <a:txBody>
+                    <a:bodyPr/>
+                    <a:lstStyle/>
+                    <a:p>
+                      <a:pPr algn="ctr" fontAlgn="ctr"/>
+                      <a:r>
+                        <a:rPr lang="en-IN" sz="1200" b="1" i="0" u="none" strike="noStrike">
+                          <a:solidFill>
+                            <a:srgbClr val="000000"/>
+                          </a:solidFill>
+                          <a:effectLst/>
+                          <a:latin typeface="Times New Roman" panose="02020603050405020304" pitchFamily="18" charset="0"/>
+                        </a:rPr>
+                        <a:t>0.18787598</a:t>
+                      </a:r>
+                    </a:p>
+                  </a:txBody>
+                  <a:tcPr marL="9525" marR="9525" marT="9525" marB="0" anchor="ctr"/>
+                </a:tc>
+                <a:tc>
+                  <a:txBody>
+                    <a:bodyPr/>
+                    <a:lstStyle/>
+                    <a:p>
+                      <a:pPr algn="ctr" fontAlgn="ctr"/>
+                      <a:r>
+                        <a:rPr lang="en-IN" sz="1200" b="1" i="0" u="none" strike="noStrike">
+                          <a:solidFill>
+                            <a:srgbClr val="000000"/>
+                          </a:solidFill>
+                          <a:effectLst/>
+                          <a:latin typeface="Times New Roman" panose="02020603050405020304" pitchFamily="18" charset="0"/>
+                        </a:rPr>
+                        <a:t>6.81</a:t>
+                      </a:r>
+                    </a:p>
+                  </a:txBody>
+                  <a:tcPr marL="9525" marR="9525" marT="9525" marB="0" anchor="ctr"/>
+                </a:tc>
+                <a:tc>
+                  <a:txBody>
+                    <a:bodyPr/>
+                    <a:lstStyle/>
+                    <a:p>
+                      <a:pPr algn="ctr" fontAlgn="ctr"/>
+                      <a:r>
+                        <a:rPr lang="en-IN" sz="1200" b="1" i="0" u="none" strike="noStrike">
+                          <a:solidFill>
+                            <a:srgbClr val="000000"/>
+                          </a:solidFill>
+                          <a:effectLst/>
+                          <a:latin typeface="Times New Roman" panose="02020603050405020304" pitchFamily="18" charset="0"/>
+                        </a:rPr>
+                        <a:t>93.19</a:t>
+                      </a:r>
+                    </a:p>
+                  </a:txBody>
+                  <a:tcPr marL="9525" marR="9525" marT="9525" marB="0" anchor="ctr"/>
+                </a:tc>
+                <a:extLst>
+                  <a:ext uri="{0D108BD9-81ED-4DB2-BD59-A6C34878D82A}">
+                    <a16:rowId xmlns:a16="http://schemas.microsoft.com/office/drawing/2014/main" val="3458874254"/>
+                  </a:ext>
+                </a:extLst>
+              </a:tr>
+              <a:tr h="370840">
+                <a:tc>
+                  <a:txBody>
+                    <a:bodyPr/>
+                    <a:lstStyle/>
+                    <a:p>
+                      <a:pPr algn="ctr" fontAlgn="ctr"/>
+                      <a:r>
+                        <a:rPr lang="en-IN" sz="1200" b="1" i="0" u="none" strike="noStrike">
+                          <a:solidFill>
+                            <a:srgbClr val="000000"/>
+                          </a:solidFill>
+                          <a:effectLst/>
+                          <a:latin typeface="Times New Roman" panose="02020603050405020304" pitchFamily="18" charset="0"/>
+                        </a:rPr>
+                        <a:t>Gradient Boosting</a:t>
+                      </a:r>
+                    </a:p>
+                  </a:txBody>
+                  <a:tcPr marL="9525" marR="9525" marT="9525" marB="0" anchor="ctr"/>
+                </a:tc>
+                <a:tc>
+                  <a:txBody>
+                    <a:bodyPr/>
+                    <a:lstStyle/>
+                    <a:p>
+                      <a:pPr algn="ctr" fontAlgn="ctr"/>
+                      <a:r>
+                        <a:rPr lang="en-IN" sz="1200" b="1" i="0" u="none" strike="noStrike">
+                          <a:solidFill>
+                            <a:srgbClr val="000000"/>
+                          </a:solidFill>
+                          <a:effectLst/>
+                          <a:latin typeface="Times New Roman" panose="02020603050405020304" pitchFamily="18" charset="0"/>
+                        </a:rPr>
+                        <a:t>0.8541</a:t>
+                      </a:r>
+                    </a:p>
+                  </a:txBody>
+                  <a:tcPr marL="9525" marR="9525" marT="9525" marB="0" anchor="ctr"/>
+                </a:tc>
+                <a:tc>
+                  <a:txBody>
+                    <a:bodyPr/>
+                    <a:lstStyle/>
+                    <a:p>
+                      <a:pPr algn="ctr" fontAlgn="ctr"/>
+                      <a:r>
+                        <a:rPr lang="en-IN" sz="1200" b="1" i="0" u="none" strike="noStrike">
+                          <a:solidFill>
+                            <a:srgbClr val="000000"/>
+                          </a:solidFill>
+                          <a:effectLst/>
+                          <a:latin typeface="Times New Roman" panose="02020603050405020304" pitchFamily="18" charset="0"/>
+                        </a:rPr>
+                        <a:t>0.64383562</a:t>
+                      </a:r>
+                    </a:p>
+                  </a:txBody>
+                  <a:tcPr marL="9525" marR="9525" marT="9525" marB="0" anchor="ctr"/>
+                </a:tc>
+                <a:tc>
+                  <a:txBody>
+                    <a:bodyPr/>
+                    <a:lstStyle/>
+                    <a:p>
+                      <a:pPr algn="ctr" fontAlgn="ctr"/>
+                      <a:r>
+                        <a:rPr lang="en-IN" sz="1200" b="1" i="0" u="none" strike="noStrike">
+                          <a:solidFill>
+                            <a:srgbClr val="000000"/>
+                          </a:solidFill>
+                          <a:effectLst/>
+                          <a:latin typeface="Times New Roman" panose="02020603050405020304" pitchFamily="18" charset="0"/>
+                        </a:rPr>
+                        <a:t>0.03175676</a:t>
+                      </a:r>
+                    </a:p>
+                  </a:txBody>
+                  <a:tcPr marL="9525" marR="9525" marT="9525" marB="0" anchor="ctr"/>
+                </a:tc>
+                <a:tc>
+                  <a:txBody>
+                    <a:bodyPr/>
+                    <a:lstStyle/>
+                    <a:p>
+                      <a:pPr algn="ctr" fontAlgn="ctr"/>
+                      <a:r>
+                        <a:rPr lang="en-IN" sz="1200" b="1" i="0" u="none" strike="noStrike">
+                          <a:solidFill>
+                            <a:srgbClr val="000000"/>
+                          </a:solidFill>
+                          <a:effectLst/>
+                          <a:latin typeface="Times New Roman" panose="02020603050405020304" pitchFamily="18" charset="0"/>
+                        </a:rPr>
+                        <a:t>0.06052801</a:t>
+                      </a:r>
+                    </a:p>
+                  </a:txBody>
+                  <a:tcPr marL="9525" marR="9525" marT="9525" marB="0" anchor="ctr"/>
+                </a:tc>
+                <a:tc>
+                  <a:txBody>
+                    <a:bodyPr/>
+                    <a:lstStyle/>
+                    <a:p>
+                      <a:pPr algn="ctr" fontAlgn="ctr"/>
+                      <a:r>
+                        <a:rPr lang="en-IN" sz="1200" b="1" i="0" u="none" strike="noStrike">
+                          <a:solidFill>
+                            <a:srgbClr val="000000"/>
+                          </a:solidFill>
+                          <a:effectLst/>
+                          <a:latin typeface="Times New Roman" panose="02020603050405020304" pitchFamily="18" charset="0"/>
+                        </a:rPr>
+                        <a:t>0.73</a:t>
+                      </a:r>
+                    </a:p>
+                  </a:txBody>
+                  <a:tcPr marL="9525" marR="9525" marT="9525" marB="0" anchor="ctr"/>
+                </a:tc>
+                <a:tc>
+                  <a:txBody>
+                    <a:bodyPr/>
+                    <a:lstStyle/>
+                    <a:p>
+                      <a:pPr algn="ctr" fontAlgn="ctr"/>
+                      <a:r>
+                        <a:rPr lang="en-IN" sz="1200" b="1" i="0" u="none" strike="noStrike">
+                          <a:solidFill>
+                            <a:srgbClr val="000000"/>
+                          </a:solidFill>
+                          <a:effectLst/>
+                          <a:latin typeface="Times New Roman" panose="02020603050405020304" pitchFamily="18" charset="0"/>
+                        </a:rPr>
+                        <a:t>99.27</a:t>
+                      </a:r>
+                    </a:p>
+                  </a:txBody>
+                  <a:tcPr marL="9525" marR="9525" marT="9525" marB="0" anchor="ctr"/>
+                </a:tc>
+                <a:extLst>
+                  <a:ext uri="{0D108BD9-81ED-4DB2-BD59-A6C34878D82A}">
+                    <a16:rowId xmlns:a16="http://schemas.microsoft.com/office/drawing/2014/main" val="1748659393"/>
+                  </a:ext>
+                </a:extLst>
+              </a:tr>
+              <a:tr h="370840">
+                <a:tc>
+                  <a:txBody>
+                    <a:bodyPr/>
+                    <a:lstStyle/>
+                    <a:p>
+                      <a:pPr algn="ctr" fontAlgn="ctr"/>
+                      <a:r>
+                        <a:rPr lang="en-IN" sz="1200" b="1" i="0" u="none" strike="noStrike">
+                          <a:solidFill>
+                            <a:srgbClr val="000000"/>
+                          </a:solidFill>
+                          <a:effectLst/>
+                          <a:latin typeface="Times New Roman" panose="02020603050405020304" pitchFamily="18" charset="0"/>
+                        </a:rPr>
+                        <a:t>XGBoost</a:t>
+                      </a:r>
+                    </a:p>
+                  </a:txBody>
+                  <a:tcPr marL="9525" marR="9525" marT="9525" marB="0" anchor="ctr"/>
+                </a:tc>
+                <a:tc>
+                  <a:txBody>
+                    <a:bodyPr/>
+                    <a:lstStyle/>
+                    <a:p>
+                      <a:pPr algn="ctr" fontAlgn="ctr"/>
+                      <a:r>
+                        <a:rPr lang="en-IN" sz="1200" b="1" i="0" u="none" strike="noStrike">
+                          <a:solidFill>
+                            <a:srgbClr val="000000"/>
+                          </a:solidFill>
+                          <a:effectLst/>
+                          <a:latin typeface="Times New Roman" panose="02020603050405020304" pitchFamily="18" charset="0"/>
+                        </a:rPr>
+                        <a:t>0.851</a:t>
+                      </a:r>
+                    </a:p>
+                  </a:txBody>
+                  <a:tcPr marL="9525" marR="9525" marT="9525" marB="0" anchor="ctr"/>
+                </a:tc>
+                <a:tc>
+                  <a:txBody>
+                    <a:bodyPr/>
+                    <a:lstStyle/>
+                    <a:p>
+                      <a:pPr algn="ctr" fontAlgn="ctr"/>
+                      <a:r>
+                        <a:rPr lang="en-IN" sz="1200" b="1" i="0" u="none" strike="noStrike">
+                          <a:solidFill>
+                            <a:srgbClr val="000000"/>
+                          </a:solidFill>
+                          <a:effectLst/>
+                          <a:latin typeface="Times New Roman" panose="02020603050405020304" pitchFamily="18" charset="0"/>
+                        </a:rPr>
+                        <a:t>0.48595506</a:t>
+                      </a:r>
+                    </a:p>
+                  </a:txBody>
+                  <a:tcPr marL="9525" marR="9525" marT="9525" marB="0" anchor="ctr"/>
+                </a:tc>
+                <a:tc>
+                  <a:txBody>
+                    <a:bodyPr/>
+                    <a:lstStyle/>
+                    <a:p>
+                      <a:pPr algn="ctr" fontAlgn="ctr"/>
+                      <a:r>
+                        <a:rPr lang="en-IN" sz="1200" b="1" i="0" u="none" strike="noStrike">
+                          <a:solidFill>
+                            <a:srgbClr val="000000"/>
+                          </a:solidFill>
+                          <a:effectLst/>
+                          <a:latin typeface="Times New Roman" panose="02020603050405020304" pitchFamily="18" charset="0"/>
+                        </a:rPr>
+                        <a:t>0.11689189</a:t>
+                      </a:r>
+                    </a:p>
+                  </a:txBody>
+                  <a:tcPr marL="9525" marR="9525" marT="9525" marB="0" anchor="ctr"/>
+                </a:tc>
+                <a:tc>
+                  <a:txBody>
+                    <a:bodyPr/>
+                    <a:lstStyle/>
+                    <a:p>
+                      <a:pPr algn="ctr" fontAlgn="ctr"/>
+                      <a:r>
+                        <a:rPr lang="en-IN" sz="1200" b="1" i="0" u="none" strike="noStrike">
+                          <a:solidFill>
+                            <a:srgbClr val="000000"/>
+                          </a:solidFill>
+                          <a:effectLst/>
+                          <a:latin typeface="Times New Roman" panose="02020603050405020304" pitchFamily="18" charset="0"/>
+                        </a:rPr>
+                        <a:t>0.18845316</a:t>
+                      </a:r>
+                    </a:p>
+                  </a:txBody>
+                  <a:tcPr marL="9525" marR="9525" marT="9525" marB="0" anchor="ctr"/>
+                </a:tc>
+                <a:tc>
+                  <a:txBody>
+                    <a:bodyPr/>
+                    <a:lstStyle/>
+                    <a:p>
+                      <a:pPr algn="ctr" fontAlgn="ctr"/>
+                      <a:r>
+                        <a:rPr lang="en-IN" sz="1200" b="1" i="0" u="none" strike="noStrike">
+                          <a:solidFill>
+                            <a:srgbClr val="000000"/>
+                          </a:solidFill>
+                          <a:effectLst/>
+                          <a:latin typeface="Times New Roman" panose="02020603050405020304" pitchFamily="18" charset="0"/>
+                        </a:rPr>
+                        <a:t>3.56</a:t>
+                      </a:r>
+                    </a:p>
+                  </a:txBody>
+                  <a:tcPr marL="9525" marR="9525" marT="9525" marB="0" anchor="ctr"/>
+                </a:tc>
+                <a:tc>
+                  <a:txBody>
+                    <a:bodyPr/>
+                    <a:lstStyle/>
+                    <a:p>
+                      <a:pPr algn="ctr" fontAlgn="ctr"/>
+                      <a:r>
+                        <a:rPr lang="en-IN" sz="1200" b="1" i="0" u="none" strike="noStrike" dirty="0">
+                          <a:solidFill>
+                            <a:srgbClr val="000000"/>
+                          </a:solidFill>
+                          <a:effectLst/>
+                          <a:latin typeface="Times New Roman" panose="02020603050405020304" pitchFamily="18" charset="0"/>
+                        </a:rPr>
+                        <a:t>96.44</a:t>
+                      </a:r>
+                    </a:p>
+                  </a:txBody>
+                  <a:tcPr marL="9525" marR="9525" marT="9525" marB="0" anchor="ctr"/>
+                </a:tc>
+                <a:extLst>
+                  <a:ext uri="{0D108BD9-81ED-4DB2-BD59-A6C34878D82A}">
+                    <a16:rowId xmlns:a16="http://schemas.microsoft.com/office/drawing/2014/main" val="2438760434"/>
+                  </a:ext>
+                </a:extLst>
+              </a:tr>
+            </a:tbl>
+          </a:graphicData>
+        </a:graphic>
+      </p:graphicFrame>
     </p:spTree>
     <p:extLst>
       <p:ext uri="{BB962C8B-B14F-4D97-AF65-F5344CB8AC3E}">

</xml_diff>